<commit_message>
correct typehint and update ppt
</commit_message>
<xml_diff>
--- a/docs/Communication.pptx
+++ b/docs/Communication.pptx
@@ -246,7 +246,7 @@
           <a:p>
             <a:fld id="{0346D313-8017-48D9-8EE8-6CFF2CF02596}" type="datetimeFigureOut">
               <a:rPr lang="de-DE" smtClean="0"/>
-              <a:t>22.02.2019</a:t>
+              <a:t>07.10.2019</a:t>
             </a:fld>
             <a:endParaRPr lang="de-DE"/>
           </a:p>
@@ -416,7 +416,7 @@
           <a:p>
             <a:fld id="{0346D313-8017-48D9-8EE8-6CFF2CF02596}" type="datetimeFigureOut">
               <a:rPr lang="de-DE" smtClean="0"/>
-              <a:t>22.02.2019</a:t>
+              <a:t>07.10.2019</a:t>
             </a:fld>
             <a:endParaRPr lang="de-DE"/>
           </a:p>
@@ -596,7 +596,7 @@
           <a:p>
             <a:fld id="{0346D313-8017-48D9-8EE8-6CFF2CF02596}" type="datetimeFigureOut">
               <a:rPr lang="de-DE" smtClean="0"/>
-              <a:t>22.02.2019</a:t>
+              <a:t>07.10.2019</a:t>
             </a:fld>
             <a:endParaRPr lang="de-DE"/>
           </a:p>
@@ -766,7 +766,7 @@
           <a:p>
             <a:fld id="{0346D313-8017-48D9-8EE8-6CFF2CF02596}" type="datetimeFigureOut">
               <a:rPr lang="de-DE" smtClean="0"/>
-              <a:t>22.02.2019</a:t>
+              <a:t>07.10.2019</a:t>
             </a:fld>
             <a:endParaRPr lang="de-DE"/>
           </a:p>
@@ -1010,7 +1010,7 @@
           <a:p>
             <a:fld id="{0346D313-8017-48D9-8EE8-6CFF2CF02596}" type="datetimeFigureOut">
               <a:rPr lang="de-DE" smtClean="0"/>
-              <a:t>22.02.2019</a:t>
+              <a:t>07.10.2019</a:t>
             </a:fld>
             <a:endParaRPr lang="de-DE"/>
           </a:p>
@@ -1242,7 +1242,7 @@
           <a:p>
             <a:fld id="{0346D313-8017-48D9-8EE8-6CFF2CF02596}" type="datetimeFigureOut">
               <a:rPr lang="de-DE" smtClean="0"/>
-              <a:t>22.02.2019</a:t>
+              <a:t>07.10.2019</a:t>
             </a:fld>
             <a:endParaRPr lang="de-DE"/>
           </a:p>
@@ -1609,7 +1609,7 @@
           <a:p>
             <a:fld id="{0346D313-8017-48D9-8EE8-6CFF2CF02596}" type="datetimeFigureOut">
               <a:rPr lang="de-DE" smtClean="0"/>
-              <a:t>22.02.2019</a:t>
+              <a:t>07.10.2019</a:t>
             </a:fld>
             <a:endParaRPr lang="de-DE"/>
           </a:p>
@@ -1727,7 +1727,7 @@
           <a:p>
             <a:fld id="{0346D313-8017-48D9-8EE8-6CFF2CF02596}" type="datetimeFigureOut">
               <a:rPr lang="de-DE" smtClean="0"/>
-              <a:t>22.02.2019</a:t>
+              <a:t>07.10.2019</a:t>
             </a:fld>
             <a:endParaRPr lang="de-DE"/>
           </a:p>
@@ -1822,7 +1822,7 @@
           <a:p>
             <a:fld id="{0346D313-8017-48D9-8EE8-6CFF2CF02596}" type="datetimeFigureOut">
               <a:rPr lang="de-DE" smtClean="0"/>
-              <a:t>22.02.2019</a:t>
+              <a:t>07.10.2019</a:t>
             </a:fld>
             <a:endParaRPr lang="de-DE"/>
           </a:p>
@@ -2099,7 +2099,7 @@
           <a:p>
             <a:fld id="{0346D313-8017-48D9-8EE8-6CFF2CF02596}" type="datetimeFigureOut">
               <a:rPr lang="de-DE" smtClean="0"/>
-              <a:t>22.02.2019</a:t>
+              <a:t>07.10.2019</a:t>
             </a:fld>
             <a:endParaRPr lang="de-DE"/>
           </a:p>
@@ -2356,7 +2356,7 @@
           <a:p>
             <a:fld id="{0346D313-8017-48D9-8EE8-6CFF2CF02596}" type="datetimeFigureOut">
               <a:rPr lang="de-DE" smtClean="0"/>
-              <a:t>22.02.2019</a:t>
+              <a:t>07.10.2019</a:t>
             </a:fld>
             <a:endParaRPr lang="de-DE"/>
           </a:p>
@@ -2569,7 +2569,7 @@
           <a:p>
             <a:fld id="{0346D313-8017-48D9-8EE8-6CFF2CF02596}" type="datetimeFigureOut">
               <a:rPr lang="de-DE" smtClean="0"/>
-              <a:t>22.02.2019</a:t>
+              <a:t>07.10.2019</a:t>
             </a:fld>
             <a:endParaRPr lang="de-DE"/>
           </a:p>
@@ -5475,7 +5475,7 @@
         </p:nvSpPr>
         <p:spPr>
           <a:xfrm>
-            <a:off x="4385863" y="6188964"/>
+            <a:off x="4749353" y="6938606"/>
             <a:ext cx="2433484" cy="604684"/>
           </a:xfrm>
           <a:prstGeom prst="rect">
@@ -5527,7 +5527,7 @@
         </p:nvSpPr>
         <p:spPr>
           <a:xfrm>
-            <a:off x="7364066" y="6206479"/>
+            <a:off x="7966792" y="7040591"/>
             <a:ext cx="2433484" cy="604684"/>
           </a:xfrm>
           <a:prstGeom prst="rect">
@@ -5576,7 +5576,7 @@
         </p:nvSpPr>
         <p:spPr>
           <a:xfrm>
-            <a:off x="7966792" y="8010330"/>
+            <a:off x="7966793" y="9209497"/>
             <a:ext cx="2433484" cy="604684"/>
           </a:xfrm>
           <a:prstGeom prst="rect">
@@ -5626,15 +5626,15 @@
           </p:cNvPr>
           <p:cNvCxnSpPr>
             <a:cxnSpLocks/>
-            <a:stCxn id="18" idx="3"/>
+            <a:stCxn id="48" idx="3"/>
             <a:endCxn id="14" idx="0"/>
           </p:cNvCxnSpPr>
           <p:nvPr/>
         </p:nvCxnSpPr>
         <p:spPr>
           <a:xfrm>
-            <a:off x="7181806" y="4710995"/>
-            <a:ext cx="1399002" cy="1495484"/>
+            <a:off x="7138374" y="4706769"/>
+            <a:ext cx="2045160" cy="2333822"/>
           </a:xfrm>
           <a:prstGeom prst="line">
             <a:avLst/>
@@ -5669,7 +5669,7 @@
         </p:nvSpPr>
         <p:spPr>
           <a:xfrm rot="21337911">
-            <a:off x="6830221" y="4400018"/>
+            <a:off x="6022003" y="6027311"/>
             <a:ext cx="679450" cy="311429"/>
           </a:xfrm>
           <a:prstGeom prst="triangle">
@@ -5719,8 +5719,8 @@
         </p:nvCxnSpPr>
         <p:spPr>
           <a:xfrm flipV="1">
-            <a:off x="5602605" y="4710995"/>
-            <a:ext cx="1579201" cy="1477969"/>
+            <a:off x="5966095" y="6338288"/>
+            <a:ext cx="407493" cy="600318"/>
           </a:xfrm>
           <a:prstGeom prst="line">
             <a:avLst/>
@@ -6061,8 +6061,8 @@
         </p:nvCxnSpPr>
         <p:spPr>
           <a:xfrm flipH="1" flipV="1">
-            <a:off x="8580808" y="6811163"/>
-            <a:ext cx="602726" cy="1199167"/>
+            <a:off x="9183534" y="7645275"/>
+            <a:ext cx="1" cy="1564222"/>
           </a:xfrm>
           <a:prstGeom prst="straightConnector1">
             <a:avLst/>
@@ -6101,7 +6101,7 @@
         </p:nvSpPr>
         <p:spPr>
           <a:xfrm rot="11013743" flipH="1" flipV="1">
-            <a:off x="9194343" y="7575906"/>
+            <a:off x="9194344" y="8773101"/>
             <a:ext cx="690056" cy="369332"/>
           </a:xfrm>
           <a:prstGeom prst="rect">
@@ -6466,9 +6466,9 @@
           <p:nvPr/>
         </p:nvCxnSpPr>
         <p:spPr>
-          <a:xfrm flipH="1" flipV="1">
-            <a:off x="5602605" y="6793648"/>
-            <a:ext cx="11834" cy="894342"/>
+          <a:xfrm flipV="1">
+            <a:off x="4558886" y="7543290"/>
+            <a:ext cx="1407209" cy="769382"/>
           </a:xfrm>
           <a:prstGeom prst="straightConnector1">
             <a:avLst/>
@@ -6496,53 +6496,6 @@
           </a:fontRef>
         </p:style>
       </p:cxnSp>
-      <p:cxnSp>
-        <p:nvCxnSpPr>
-          <p:cNvPr id="38" name="Gerade Verbindung mit Pfeil 37">
-            <a:extLst>
-              <a:ext uri="{FF2B5EF4-FFF2-40B4-BE49-F238E27FC236}">
-                <a16:creationId xmlns:a16="http://schemas.microsoft.com/office/drawing/2014/main" id="{14D8F63A-65CE-42CF-9AF2-87E2BCEC9DE2}"/>
-              </a:ext>
-            </a:extLst>
-          </p:cNvPr>
-          <p:cNvCxnSpPr>
-            <a:cxnSpLocks/>
-            <a:stCxn id="13" idx="0"/>
-            <a:endCxn id="25" idx="2"/>
-          </p:cNvCxnSpPr>
-          <p:nvPr/>
-        </p:nvCxnSpPr>
-        <p:spPr>
-          <a:xfrm flipH="1" flipV="1">
-            <a:off x="3930972" y="5338759"/>
-            <a:ext cx="1671633" cy="850205"/>
-          </a:xfrm>
-          <a:prstGeom prst="straightConnector1">
-            <a:avLst/>
-          </a:prstGeom>
-          <a:ln w="22225">
-            <a:solidFill>
-              <a:srgbClr val="92D050"/>
-            </a:solidFill>
-            <a:headEnd type="diamond" w="lg" len="lg"/>
-            <a:tailEnd type="diamond" w="lg" len="lg"/>
-          </a:ln>
-        </p:spPr>
-        <p:style>
-          <a:lnRef idx="1">
-            <a:schemeClr val="accent1"/>
-          </a:lnRef>
-          <a:fillRef idx="0">
-            <a:schemeClr val="accent1"/>
-          </a:fillRef>
-          <a:effectRef idx="0">
-            <a:schemeClr val="accent1"/>
-          </a:effectRef>
-          <a:fontRef idx="minor">
-            <a:schemeClr val="tx1"/>
-          </a:fontRef>
-        </p:style>
-      </p:cxnSp>
       <p:sp>
         <p:nvSpPr>
           <p:cNvPr id="37" name="Smiley 36">
@@ -6557,7 +6510,7 @@
         </p:nvSpPr>
         <p:spPr>
           <a:xfrm>
-            <a:off x="5147714" y="7687990"/>
+            <a:off x="4092161" y="8312672"/>
             <a:ext cx="933450" cy="952500"/>
           </a:xfrm>
           <a:prstGeom prst="smileyFace">
@@ -6566,6 +6519,353 @@
           <a:solidFill>
             <a:srgbClr val="92D050"/>
           </a:solidFill>
+        </p:spPr>
+        <p:style>
+          <a:lnRef idx="2">
+            <a:schemeClr val="accent1">
+              <a:shade val="50000"/>
+            </a:schemeClr>
+          </a:lnRef>
+          <a:fillRef idx="1">
+            <a:schemeClr val="accent1"/>
+          </a:fillRef>
+          <a:effectRef idx="0">
+            <a:schemeClr val="accent1"/>
+          </a:effectRef>
+          <a:fontRef idx="minor">
+            <a:schemeClr val="lt1"/>
+          </a:fontRef>
+        </p:style>
+        <p:txBody>
+          <a:bodyPr rtlCol="0" anchor="ctr"/>
+          <a:lstStyle/>
+          <a:p>
+            <a:pPr algn="ctr"/>
+            <a:endParaRPr lang="de-DE"/>
+          </a:p>
+        </p:txBody>
+      </p:sp>
+      <p:cxnSp>
+        <p:nvCxnSpPr>
+          <p:cNvPr id="32" name="Gerade Verbindung mit Pfeil 31">
+            <a:extLst>
+              <a:ext uri="{FF2B5EF4-FFF2-40B4-BE49-F238E27FC236}">
+                <a16:creationId xmlns:a16="http://schemas.microsoft.com/office/drawing/2014/main" id="{9CABF327-C74C-4D79-8010-EBEF8E17B05F}"/>
+              </a:ext>
+            </a:extLst>
+          </p:cNvPr>
+          <p:cNvCxnSpPr>
+            <a:cxnSpLocks/>
+            <a:stCxn id="4" idx="1"/>
+            <a:endCxn id="12" idx="3"/>
+          </p:cNvCxnSpPr>
+          <p:nvPr/>
+        </p:nvCxnSpPr>
+        <p:spPr>
+          <a:xfrm flipH="1">
+            <a:off x="3957567" y="1554727"/>
+            <a:ext cx="1575741" cy="2026801"/>
+          </a:xfrm>
+          <a:prstGeom prst="straightConnector1">
+            <a:avLst/>
+          </a:prstGeom>
+          <a:ln w="34925">
+            <a:headEnd type="none" w="med" len="med"/>
+            <a:tailEnd type="arrow" w="lg" len="lg"/>
+          </a:ln>
+        </p:spPr>
+        <p:style>
+          <a:lnRef idx="1">
+            <a:schemeClr val="accent1"/>
+          </a:lnRef>
+          <a:fillRef idx="0">
+            <a:schemeClr val="accent1"/>
+          </a:fillRef>
+          <a:effectRef idx="0">
+            <a:schemeClr val="accent1"/>
+          </a:effectRef>
+          <a:fontRef idx="minor">
+            <a:schemeClr val="tx1"/>
+          </a:fontRef>
+        </p:style>
+      </p:cxnSp>
+      <p:sp>
+        <p:nvSpPr>
+          <p:cNvPr id="36" name="Textfeld 35">
+            <a:extLst>
+              <a:ext uri="{FF2B5EF4-FFF2-40B4-BE49-F238E27FC236}">
+                <a16:creationId xmlns:a16="http://schemas.microsoft.com/office/drawing/2014/main" id="{16D1BA27-1B86-45A7-83D5-2B325E6CC64F}"/>
+              </a:ext>
+            </a:extLst>
+          </p:cNvPr>
+          <p:cNvSpPr txBox="1"/>
+          <p:nvPr/>
+        </p:nvSpPr>
+        <p:spPr>
+          <a:xfrm rot="11013743" flipH="1" flipV="1">
+            <a:off x="5544116" y="3553136"/>
+            <a:ext cx="690056" cy="369332"/>
+          </a:xfrm>
+          <a:prstGeom prst="rect">
+            <a:avLst/>
+          </a:prstGeom>
+          <a:noFill/>
+        </p:spPr>
+        <p:txBody>
+          <a:bodyPr wrap="square" rtlCol="0">
+            <a:spAutoFit/>
+          </a:bodyPr>
+          <a:lstStyle/>
+          <a:p>
+            <a:r>
+              <a:rPr lang="de-DE"/>
+              <a:t>2</a:t>
+            </a:r>
+            <a:endParaRPr lang="de-DE" dirty="0"/>
+          </a:p>
+        </p:txBody>
+      </p:sp>
+      <p:sp>
+        <p:nvSpPr>
+          <p:cNvPr id="40" name="Textfeld 39">
+            <a:extLst>
+              <a:ext uri="{FF2B5EF4-FFF2-40B4-BE49-F238E27FC236}">
+                <a16:creationId xmlns:a16="http://schemas.microsoft.com/office/drawing/2014/main" id="{4B94F73B-784D-408F-9D50-99C1AE22DD94}"/>
+              </a:ext>
+            </a:extLst>
+          </p:cNvPr>
+          <p:cNvSpPr txBox="1"/>
+          <p:nvPr/>
+        </p:nvSpPr>
+        <p:spPr>
+          <a:xfrm rot="11013743" flipH="1" flipV="1">
+            <a:off x="5158521" y="1946276"/>
+            <a:ext cx="690056" cy="369332"/>
+          </a:xfrm>
+          <a:prstGeom prst="rect">
+            <a:avLst/>
+          </a:prstGeom>
+          <a:noFill/>
+        </p:spPr>
+        <p:txBody>
+          <a:bodyPr wrap="square" rtlCol="0">
+            <a:spAutoFit/>
+          </a:bodyPr>
+          <a:lstStyle/>
+          <a:p>
+            <a:r>
+              <a:rPr lang="de-DE" dirty="0"/>
+              <a:t>1</a:t>
+            </a:r>
+          </a:p>
+        </p:txBody>
+      </p:sp>
+      <p:sp>
+        <p:nvSpPr>
+          <p:cNvPr id="45" name="Rechteck 44">
+            <a:extLst>
+              <a:ext uri="{FF2B5EF4-FFF2-40B4-BE49-F238E27FC236}">
+                <a16:creationId xmlns:a16="http://schemas.microsoft.com/office/drawing/2014/main" id="{25CD773E-58A3-4595-A241-E95646D5229A}"/>
+              </a:ext>
+            </a:extLst>
+          </p:cNvPr>
+          <p:cNvSpPr/>
+          <p:nvPr/>
+        </p:nvSpPr>
+        <p:spPr>
+          <a:xfrm>
+            <a:off x="5151025" y="5444897"/>
+            <a:ext cx="2433484" cy="604684"/>
+          </a:xfrm>
+          <a:prstGeom prst="rect">
+            <a:avLst/>
+          </a:prstGeom>
+        </p:spPr>
+        <p:style>
+          <a:lnRef idx="2">
+            <a:schemeClr val="accent1">
+              <a:shade val="50000"/>
+            </a:schemeClr>
+          </a:lnRef>
+          <a:fillRef idx="1">
+            <a:schemeClr val="accent1"/>
+          </a:fillRef>
+          <a:effectRef idx="0">
+            <a:schemeClr val="accent1"/>
+          </a:effectRef>
+          <a:fontRef idx="minor">
+            <a:schemeClr val="lt1"/>
+          </a:fontRef>
+        </p:style>
+        <p:txBody>
+          <a:bodyPr rtlCol="0" anchor="ctr"/>
+          <a:lstStyle/>
+          <a:p>
+            <a:pPr algn="ctr"/>
+            <a:r>
+              <a:rPr lang="de-DE"/>
+              <a:t>SingleConnector</a:t>
+            </a:r>
+            <a:endParaRPr lang="de-DE" dirty="0"/>
+          </a:p>
+        </p:txBody>
+      </p:sp>
+      <p:cxnSp>
+        <p:nvCxnSpPr>
+          <p:cNvPr id="47" name="Gerader Verbinder 46">
+            <a:extLst>
+              <a:ext uri="{FF2B5EF4-FFF2-40B4-BE49-F238E27FC236}">
+                <a16:creationId xmlns:a16="http://schemas.microsoft.com/office/drawing/2014/main" id="{97C40590-1FBD-45C3-AD87-AEB2C8DD659C}"/>
+              </a:ext>
+            </a:extLst>
+          </p:cNvPr>
+          <p:cNvCxnSpPr>
+            <a:cxnSpLocks/>
+            <a:stCxn id="48" idx="3"/>
+            <a:endCxn id="45" idx="0"/>
+          </p:cNvCxnSpPr>
+          <p:nvPr/>
+        </p:nvCxnSpPr>
+        <p:spPr>
+          <a:xfrm flipH="1">
+            <a:off x="6367767" y="4706769"/>
+            <a:ext cx="770607" cy="738128"/>
+          </a:xfrm>
+          <a:prstGeom prst="line">
+            <a:avLst/>
+          </a:prstGeom>
+        </p:spPr>
+        <p:style>
+          <a:lnRef idx="1">
+            <a:schemeClr val="accent1"/>
+          </a:lnRef>
+          <a:fillRef idx="0">
+            <a:schemeClr val="accent1"/>
+          </a:fillRef>
+          <a:effectRef idx="0">
+            <a:schemeClr val="accent1"/>
+          </a:effectRef>
+          <a:fontRef idx="minor">
+            <a:schemeClr val="tx1"/>
+          </a:fontRef>
+        </p:style>
+      </p:cxnSp>
+      <p:sp>
+        <p:nvSpPr>
+          <p:cNvPr id="48" name="Gleichschenkliges Dreieck 47">
+            <a:extLst>
+              <a:ext uri="{FF2B5EF4-FFF2-40B4-BE49-F238E27FC236}">
+                <a16:creationId xmlns:a16="http://schemas.microsoft.com/office/drawing/2014/main" id="{3DABC270-76FC-467B-8604-8A73C8FBF866}"/>
+              </a:ext>
+            </a:extLst>
+          </p:cNvPr>
+          <p:cNvSpPr/>
+          <p:nvPr/>
+        </p:nvSpPr>
+        <p:spPr>
+          <a:xfrm rot="21337911">
+            <a:off x="6786789" y="4395792"/>
+            <a:ext cx="679450" cy="311429"/>
+          </a:xfrm>
+          <a:prstGeom prst="triangle">
+            <a:avLst/>
+          </a:prstGeom>
+        </p:spPr>
+        <p:style>
+          <a:lnRef idx="2">
+            <a:schemeClr val="accent1">
+              <a:shade val="50000"/>
+            </a:schemeClr>
+          </a:lnRef>
+          <a:fillRef idx="1">
+            <a:schemeClr val="accent1"/>
+          </a:fillRef>
+          <a:effectRef idx="0">
+            <a:schemeClr val="accent1"/>
+          </a:effectRef>
+          <a:fontRef idx="minor">
+            <a:schemeClr val="lt1"/>
+          </a:fontRef>
+        </p:style>
+        <p:txBody>
+          <a:bodyPr rtlCol="0" anchor="ctr"/>
+          <a:lstStyle/>
+          <a:p>
+            <a:pPr algn="ctr"/>
+            <a:endParaRPr lang="de-DE"/>
+          </a:p>
+        </p:txBody>
+      </p:sp>
+      <p:sp>
+        <p:nvSpPr>
+          <p:cNvPr id="63" name="Rechteck 62">
+            <a:extLst>
+              <a:ext uri="{FF2B5EF4-FFF2-40B4-BE49-F238E27FC236}">
+                <a16:creationId xmlns:a16="http://schemas.microsoft.com/office/drawing/2014/main" id="{2006B25F-E825-445D-8BFE-82BB950AF402}"/>
+              </a:ext>
+            </a:extLst>
+          </p:cNvPr>
+          <p:cNvSpPr/>
+          <p:nvPr/>
+        </p:nvSpPr>
+        <p:spPr>
+          <a:xfrm>
+            <a:off x="10569063" y="7796814"/>
+            <a:ext cx="2542253" cy="604684"/>
+          </a:xfrm>
+          <a:prstGeom prst="rect">
+            <a:avLst/>
+          </a:prstGeom>
+        </p:spPr>
+        <p:style>
+          <a:lnRef idx="2">
+            <a:schemeClr val="accent1">
+              <a:shade val="50000"/>
+            </a:schemeClr>
+          </a:lnRef>
+          <a:fillRef idx="1">
+            <a:schemeClr val="accent1"/>
+          </a:fillRef>
+          <a:effectRef idx="0">
+            <a:schemeClr val="accent1"/>
+          </a:effectRef>
+          <a:fontRef idx="minor">
+            <a:schemeClr val="lt1"/>
+          </a:fontRef>
+        </p:style>
+        <p:txBody>
+          <a:bodyPr rtlCol="0" anchor="ctr"/>
+          <a:lstStyle/>
+          <a:p>
+            <a:pPr algn="ctr"/>
+            <a:r>
+              <a:rPr lang="de-DE"/>
+              <a:t>MetaClientManager</a:t>
+            </a:r>
+            <a:endParaRPr lang="de-DE" dirty="0"/>
+          </a:p>
+        </p:txBody>
+      </p:sp>
+      <p:sp>
+        <p:nvSpPr>
+          <p:cNvPr id="64" name="Pfeil: nach unten 63">
+            <a:extLst>
+              <a:ext uri="{FF2B5EF4-FFF2-40B4-BE49-F238E27FC236}">
+                <a16:creationId xmlns:a16="http://schemas.microsoft.com/office/drawing/2014/main" id="{ECF66F9D-46BC-45E9-916A-F559EF5B636C}"/>
+              </a:ext>
+            </a:extLst>
+          </p:cNvPr>
+          <p:cNvSpPr/>
+          <p:nvPr/>
+        </p:nvSpPr>
+        <p:spPr>
+          <a:xfrm rot="12845517">
+            <a:off x="10572598" y="8257708"/>
+            <a:ext cx="572112" cy="1513171"/>
+          </a:xfrm>
+          <a:prstGeom prst="downArrow">
+            <a:avLst/>
+          </a:prstGeom>
         </p:spPr>
         <p:style>
           <a:lnRef idx="2">

</xml_diff>